<commit_message>
IDE 09 überarbeitet wegen Promotion
</commit_message>
<xml_diff>
--- a/training-cards/music moves/Ideas (IDE)/ger/apprentice/ger_IDE_09_Ideenrangfolge_MM_A.pptx
+++ b/training-cards/music moves/Ideas (IDE)/ger/apprentice/ger_IDE_09_Ideenrangfolge_MM_A.pptx
@@ -105,6 +105,22 @@
       </a:defRPr>
     </a:lvl9pPr>
   </p:defaultTextStyle>
+  <p:extLst>
+    <p:ext uri="{EFAFB233-063F-42B5-8137-9DF3F51BA10A}">
+      <p15:sldGuideLst xmlns:p15="http://schemas.microsoft.com/office/powerpoint/2012/main">
+        <p15:guide id="1" orient="horz" pos="652">
+          <p15:clr>
+            <a:srgbClr val="A4A3A4"/>
+          </p15:clr>
+        </p15:guide>
+        <p15:guide id="2">
+          <p15:clr>
+            <a:srgbClr val="A4A3A4"/>
+          </p15:clr>
+        </p15:guide>
+      </p15:sldGuideLst>
+    </p:ext>
+  </p:extLst>
 </p:presentation>
 </file>
 
@@ -153,10 +169,9 @@
           </a:lstStyle>
           <a:p>
             <a:r>
-              <a:rPr lang="de-DE" dirty="0" smtClean="0"/>
+              <a:rPr lang="de-DE" dirty="0"/>
               <a:t>TITEL HINZUFÜGEN</a:t>
             </a:r>
-            <a:endParaRPr lang="de-DE" dirty="0"/>
           </a:p>
         </p:txBody>
       </p:sp>
@@ -187,35 +202,35 @@
           <a:p>
             <a:pPr lvl="0"/>
             <a:r>
-              <a:rPr lang="de-DE" smtClean="0"/>
+              <a:rPr lang="de-DE"/>
               <a:t>Mastertextformat bearbeiten</a:t>
             </a:r>
           </a:p>
           <a:p>
             <a:pPr lvl="1"/>
             <a:r>
-              <a:rPr lang="de-DE" smtClean="0"/>
+              <a:rPr lang="de-DE"/>
               <a:t>Zweite Ebene</a:t>
             </a:r>
           </a:p>
           <a:p>
             <a:pPr lvl="2"/>
             <a:r>
-              <a:rPr lang="de-DE" smtClean="0"/>
+              <a:rPr lang="de-DE"/>
               <a:t>Dritte Ebene</a:t>
             </a:r>
           </a:p>
           <a:p>
             <a:pPr lvl="3"/>
             <a:r>
-              <a:rPr lang="de-DE" smtClean="0"/>
+              <a:rPr lang="de-DE"/>
               <a:t>Vierte Ebene</a:t>
             </a:r>
           </a:p>
           <a:p>
             <a:pPr lvl="4"/>
             <a:r>
-              <a:rPr lang="de-DE" smtClean="0"/>
+              <a:rPr lang="de-DE"/>
               <a:t>Fünfte Ebene</a:t>
             </a:r>
             <a:endParaRPr lang="de-DE" dirty="0"/>
@@ -262,7 +277,7 @@
               <a:buNone/>
             </a:pPr>
             <a:r>
-              <a:rPr lang="de-DE" smtClean="0"/>
+              <a:rPr lang="de-DE"/>
               <a:t>Master-Untertitelformat bearbeiten</a:t>
             </a:r>
             <a:endParaRPr lang="de-DE" dirty="0"/>
@@ -378,35 +393,35 @@
           <a:p>
             <a:pPr lvl="0"/>
             <a:r>
-              <a:rPr lang="de-DE" smtClean="0"/>
+              <a:rPr lang="de-DE"/>
               <a:t>Mastertextformat bearbeiten</a:t>
             </a:r>
           </a:p>
           <a:p>
             <a:pPr lvl="1"/>
             <a:r>
-              <a:rPr lang="de-DE" smtClean="0"/>
+              <a:rPr lang="de-DE"/>
               <a:t>Zweite Ebene</a:t>
             </a:r>
           </a:p>
           <a:p>
             <a:pPr lvl="2"/>
             <a:r>
-              <a:rPr lang="de-DE" smtClean="0"/>
+              <a:rPr lang="de-DE"/>
               <a:t>Dritte Ebene</a:t>
             </a:r>
           </a:p>
           <a:p>
             <a:pPr lvl="3"/>
             <a:r>
-              <a:rPr lang="de-DE" smtClean="0"/>
+              <a:rPr lang="de-DE"/>
               <a:t>Vierte Ebene</a:t>
             </a:r>
           </a:p>
           <a:p>
             <a:pPr lvl="4"/>
             <a:r>
-              <a:rPr lang="de-DE" smtClean="0"/>
+              <a:rPr lang="de-DE"/>
               <a:t>Fünfte Ebene</a:t>
             </a:r>
             <a:endParaRPr lang="de-DE" dirty="0"/>
@@ -436,7 +451,7 @@
           <a:lstStyle/>
           <a:p>
             <a:r>
-              <a:rPr lang="de-DE" sz="2400" dirty="0" smtClean="0">
+              <a:rPr lang="de-DE" sz="2400" dirty="0">
                 <a:solidFill>
                   <a:srgbClr val="7E006B"/>
                 </a:solidFill>
@@ -446,7 +461,7 @@
               <a:t>TR	AININGS</a:t>
             </a:r>
             <a:r>
-              <a:rPr lang="de-DE" sz="2400" dirty="0" smtClean="0">
+              <a:rPr lang="de-DE" sz="2400" dirty="0">
                 <a:solidFill>
                   <a:srgbClr val="7E006B"/>
                 </a:solidFill>
@@ -514,7 +529,7 @@
           </a:ln>
           <a:extLst>
             <a:ext uri="{C572A759-6A51-4108-AA02-DFA0A04FC94B}">
-              <ma14:wrappingTextBoxFlag xmlns:ma14="http://schemas.microsoft.com/office/mac/drawingml/2011/main" val="1"/>
+              <ma14:wrappingTextBoxFlag xmlns:ma14="http://schemas.microsoft.com/office/mac/drawingml/2011/main" xmlns="" val="1"/>
             </a:ext>
           </a:extLst>
         </p:spPr>
@@ -560,9 +575,7 @@
           <p:nvPr userDrawn="1"/>
         </p:nvPicPr>
         <p:blipFill>
-          <a:blip r:embed="rId4">
-            <a:extLst/>
-          </a:blip>
+          <a:blip r:embed="rId4"/>
           <a:stretch>
             <a:fillRect/>
           </a:stretch>
@@ -620,7 +633,7 @@
                 <a:latin typeface="Avenir Light"/>
                 <a:cs typeface="Avenir Light"/>
               </a:rPr>
-              <a:t>22.11.15</a:t>
+              <a:t>20.07.23</a:t>
             </a:fld>
             <a:endParaRPr lang="de-DE" sz="600" dirty="0">
               <a:solidFill>
@@ -678,10 +691,9 @@
           <a:lstStyle/>
           <a:p>
             <a:r>
-              <a:rPr lang="de-DE" smtClean="0"/>
+              <a:rPr lang="de-DE"/>
               <a:t>Mastertitelformat bearbeiten</a:t>
             </a:r>
-            <a:endParaRPr lang="de-DE"/>
           </a:p>
         </p:txBody>
       </p:sp>
@@ -702,7 +714,7 @@
           <a:p>
             <a:fld id="{FF5B2BAF-DF38-0A48-A798-0C06E514FD52}" type="datetimeFigureOut">
               <a:rPr lang="de-DE" smtClean="0"/>
-              <a:t>22.11.15</a:t>
+              <a:t>20.07.23</a:t>
             </a:fld>
             <a:endParaRPr lang="de-DE" dirty="0"/>
           </a:p>
@@ -813,17 +825,16 @@
           <a:p>
             <a:pPr marL="0" lvl="0" algn="l"/>
             <a:r>
-              <a:rPr lang="de-DE" dirty="0" smtClean="0"/>
+              <a:rPr lang="de-DE" dirty="0"/>
               <a:t>Überschrift </a:t>
             </a:r>
             <a:br>
-              <a:rPr lang="de-DE" dirty="0" smtClean="0"/>
+              <a:rPr lang="de-DE" dirty="0"/>
             </a:br>
             <a:r>
-              <a:rPr lang="de-DE" dirty="0" smtClean="0"/>
+              <a:rPr lang="de-DE" dirty="0"/>
               <a:t>bearbeiten </a:t>
             </a:r>
-            <a:endParaRPr lang="de-DE" dirty="0"/>
           </a:p>
         </p:txBody>
       </p:sp>
@@ -854,38 +865,37 @@
           <a:p>
             <a:pPr lvl="0"/>
             <a:r>
-              <a:rPr lang="de-DE" dirty="0" smtClean="0"/>
+              <a:rPr lang="de-DE" dirty="0"/>
               <a:t>Mastertextformat bearbeiten</a:t>
             </a:r>
           </a:p>
           <a:p>
             <a:pPr lvl="1"/>
             <a:r>
-              <a:rPr lang="de-DE" dirty="0" smtClean="0"/>
+              <a:rPr lang="de-DE" dirty="0"/>
               <a:t>Zweite Ebene</a:t>
             </a:r>
           </a:p>
           <a:p>
             <a:pPr lvl="2"/>
             <a:r>
-              <a:rPr lang="de-DE" dirty="0" smtClean="0"/>
+              <a:rPr lang="de-DE" dirty="0"/>
               <a:t>Dritte Ebene</a:t>
             </a:r>
           </a:p>
           <a:p>
             <a:pPr lvl="3"/>
             <a:r>
-              <a:rPr lang="de-DE" dirty="0" smtClean="0"/>
+              <a:rPr lang="de-DE" dirty="0"/>
               <a:t>Vierte Ebene</a:t>
             </a:r>
           </a:p>
           <a:p>
             <a:pPr lvl="4"/>
             <a:r>
-              <a:rPr lang="de-DE" dirty="0" smtClean="0"/>
+              <a:rPr lang="de-DE" dirty="0"/>
               <a:t>Fünfte Ebene</a:t>
             </a:r>
-            <a:endParaRPr lang="de-DE" dirty="0"/>
           </a:p>
         </p:txBody>
       </p:sp>
@@ -924,7 +934,7 @@
           <a:p>
             <a:fld id="{FF5B2BAF-DF38-0A48-A798-0C06E514FD52}" type="datetimeFigureOut">
               <a:rPr lang="de-DE" smtClean="0"/>
-              <a:t>22.11.15</a:t>
+              <a:t>20.07.23</a:t>
             </a:fld>
             <a:endParaRPr lang="de-DE" dirty="0"/>
           </a:p>
@@ -1158,7 +1168,7 @@
           <a:lstStyle/>
           <a:p>
             <a:r>
-              <a:rPr lang="de-DE" sz="1050" b="1" dirty="0" smtClean="0">
+              <a:rPr lang="de-DE" sz="1050" b="1" dirty="0">
                 <a:solidFill>
                   <a:schemeClr val="bg1"/>
                 </a:solidFill>
@@ -1168,7 +1178,7 @@
               <a:t>TRAININGSKARTE</a:t>
             </a:r>
             <a:r>
-              <a:rPr lang="de-DE" sz="1050" dirty="0" smtClean="0">
+              <a:rPr lang="de-DE" sz="1050" dirty="0">
                 <a:solidFill>
                   <a:schemeClr val="bg1"/>
                 </a:solidFill>
@@ -1178,7 +1188,7 @@
               <a:t> </a:t>
             </a:r>
             <a:r>
-              <a:rPr lang="de-DE" sz="1050" b="1" dirty="0" smtClean="0">
+              <a:rPr lang="de-DE" sz="1050" b="1" dirty="0">
                 <a:solidFill>
                   <a:schemeClr val="bg1"/>
                 </a:solidFill>
@@ -1188,7 +1198,7 @@
               <a:t>IDE</a:t>
             </a:r>
             <a:r>
-              <a:rPr lang="de-DE" sz="1050" b="1" baseline="0" dirty="0" smtClean="0">
+              <a:rPr lang="de-DE" sz="1050" b="1" baseline="0" dirty="0">
                 <a:solidFill>
                   <a:schemeClr val="bg1"/>
                 </a:solidFill>
@@ -1586,17 +1596,16 @@
           <a:lstStyle/>
           <a:p>
             <a:r>
-              <a:rPr lang="de-DE" dirty="0" smtClean="0">
+              <a:rPr lang="de-DE" dirty="0">
                 <a:latin typeface="Avenir Heavy"/>
                 <a:cs typeface="Avenir Heavy"/>
               </a:rPr>
               <a:t>IDEEN</a:t>
             </a:r>
             <a:r>
-              <a:rPr lang="de-DE" dirty="0" smtClean="0"/>
+              <a:rPr lang="de-DE" dirty="0"/>
               <a:t>RANGFOLGE</a:t>
             </a:r>
-            <a:endParaRPr lang="de-DE" dirty="0"/>
           </a:p>
         </p:txBody>
       </p:sp>
@@ -1630,7 +1639,13 @@
           <a:p>
             <a:r>
               <a:rPr lang="de-DE" sz="900" dirty="0"/>
-              <a:t>Eine Möglichkeit ist es, den Ideen eine Rangfolge zu geben. In der agilen Entwicklung nennt man eine nach Wichtigkeit priorisierte Aufgabenliste "</a:t>
+              <a:t>Eine Möglichkeit ist es, den Ideen eine Rangfolge zu geben. In der agilen Entwicklung nennt man eine nach Wichtigkeit oder Qualität priorisierte Aufgabenliste "Backlog".</a:t>
+            </a:r>
+          </a:p>
+          <a:p>
+            <a:r>
+              <a:rPr lang="de-DE" sz="900" dirty="0"/>
+              <a:t>Ein solches </a:t>
             </a:r>
             <a:r>
               <a:rPr lang="de-DE" sz="900" dirty="0" err="1"/>
@@ -1638,13 +1653,21 @@
             </a:r>
             <a:r>
               <a:rPr lang="de-DE" sz="900" dirty="0"/>
-              <a:t>".</a:t>
-            </a:r>
-          </a:p>
-          <a:p>
+              <a:t> kannst Du auch für Deine Ideen erstellen. Wenn Du mit Post </a:t>
+            </a:r>
+            <a:r>
+              <a:rPr lang="de-DE" sz="900" dirty="0" err="1"/>
+              <a:t>Its</a:t>
+            </a:r>
             <a:r>
               <a:rPr lang="de-DE" sz="900" dirty="0"/>
-              <a:t>Ein solches </a:t>
+              <a:t> arbeitest, kannst Du die Ideen ganz leicht neu anordnen. Wenn Du bisher ein Ideenbuch verwendet hast, musst Du Dir vielleicht eine weitere Möglichkeit überlegen, wohin Du Deine Ideen schreiben und Ihnen gleichzeitig eine Rangfolge geben kannst.  </a:t>
+            </a:r>
+          </a:p>
+          <a:p>
+            <a:r>
+              <a:rPr lang="de-DE" sz="900" dirty="0"/>
+              <a:t>Die Plätze ganz oben im </a:t>
             </a:r>
             <a:r>
               <a:rPr lang="de-DE" sz="900" dirty="0" err="1"/>
@@ -1652,21 +1675,61 @@
             </a:r>
             <a:r>
               <a:rPr lang="de-DE" sz="900" dirty="0"/>
-              <a:t> kannst Du auch für Deine Ideen erstellen. Wenn Du mit Post </a:t>
-            </a:r>
-            <a:r>
-              <a:rPr lang="de-DE" sz="900" dirty="0" err="1"/>
-              <a:t>Its</a:t>
-            </a:r>
+              <a:t> sind die wichtigsten oder auch die "wertvollsten". Indem Du alle Faktoren, die eine Idee betreffen, mit einbeziehst, vergibst Du aus dem Gesamtbild eine Rangfolge.</a:t>
+            </a:r>
+          </a:p>
+          <a:p>
             <a:r>
               <a:rPr lang="de-DE" sz="900" dirty="0"/>
-              <a:t> arbeitest, kannst Du die Ideen ganz leicht neu anordnen. Wenn Du bisher ein Ideenbuch verwendet hast, musst Du Dir vielleicht eine weitere Möglichkeit überlegen, wohin Du Deine Ideen schreiben und Ihnen gleichzeitig eine Rangfolge geben kannst.  </a:t>
-            </a:r>
-          </a:p>
-          <a:p>
+              <a:t>Solche Faktoren könnten sein:</a:t>
+            </a:r>
+          </a:p>
+          <a:p>
+            <a:pPr lvl="1"/>
             <a:r>
               <a:rPr lang="de-DE" sz="900" dirty="0"/>
-              <a:t>Die Plätze ganz oben im </a:t>
+              <a:t>Wie gut finde ich die Idee?</a:t>
+            </a:r>
+          </a:p>
+          <a:p>
+            <a:pPr lvl="1"/>
+            <a:r>
+              <a:rPr lang="de-DE" sz="900" dirty="0"/>
+              <a:t>Habe ich Zeitdruck die Idee umzusetzen? Wird die Idee bald verfallen bzw. nicht mehr umsetzbar sein?</a:t>
+            </a:r>
+          </a:p>
+          <a:p>
+            <a:pPr lvl="1"/>
+            <a:r>
+              <a:rPr lang="de-DE" sz="900" dirty="0"/>
+              <a:t>Gibt es negative Konsequenzen, wenn die Idee übergangen wird?</a:t>
+            </a:r>
+          </a:p>
+          <a:p>
+            <a:pPr lvl="1"/>
+            <a:r>
+              <a:rPr lang="de-DE" sz="900" dirty="0"/>
+              <a:t>Inwiefern kann ich mich persönlich durch die Idee weiterentwickeln?</a:t>
+            </a:r>
+          </a:p>
+          <a:p>
+            <a:pPr lvl="1"/>
+            <a:r>
+              <a:rPr lang="de-DE" sz="900" dirty="0"/>
+              <a:t>Wie sehr kann ich mich durch die Idee selbst ausdrücken?</a:t>
+            </a:r>
+          </a:p>
+          <a:p>
+            <a:pPr lvl="1"/>
+            <a:r>
+              <a:rPr lang="de-DE" sz="900" dirty="0"/>
+              <a:t>Wird durch die Idee etwas grundsätzlich leichter oder weniger riskant?</a:t>
+            </a:r>
+          </a:p>
+          <a:p>
+            <a:r>
+              <a:rPr lang="de-DE" sz="900" dirty="0"/>
+              <a:t>Ein </a:t>
             </a:r>
             <a:r>
               <a:rPr lang="de-DE" sz="900" dirty="0" err="1"/>
@@ -1674,61 +1737,7 @@
             </a:r>
             <a:r>
               <a:rPr lang="de-DE" sz="900" dirty="0"/>
-              <a:t> sind die wichtigsten oder auch die "wertvollsten". Indem Du alle Faktoren, die eine Idee betreffen, mit einbeziehst, vergibst Du aus dem Gesamtbild eine Rangfolge.</a:t>
-            </a:r>
-          </a:p>
-          <a:p>
-            <a:r>
-              <a:rPr lang="de-DE" sz="900" dirty="0"/>
-              <a:t>Solche Faktoren könnten sein:</a:t>
-            </a:r>
-          </a:p>
-          <a:p>
-            <a:pPr lvl="1"/>
-            <a:r>
-              <a:rPr lang="de-DE" sz="900" dirty="0"/>
-              <a:t>Wie gute finde ich die Idee?</a:t>
-            </a:r>
-          </a:p>
-          <a:p>
-            <a:pPr lvl="1"/>
-            <a:r>
-              <a:rPr lang="de-DE" sz="900" dirty="0"/>
-              <a:t>Habe ich Zeitdruck die Idee umzusetzen? Wird die Idee bald verfallen bzw. nicht mehr umsetzbar sein?</a:t>
-            </a:r>
-          </a:p>
-          <a:p>
-            <a:pPr lvl="1"/>
-            <a:r>
-              <a:rPr lang="de-DE" sz="900" dirty="0"/>
-              <a:t>Gibt es negative Konsequenzen, wenn die Idee übergangen wird?</a:t>
-            </a:r>
-          </a:p>
-          <a:p>
-            <a:pPr lvl="1"/>
-            <a:r>
-              <a:rPr lang="de-DE" sz="900" dirty="0"/>
-              <a:t>Inwiefern kann ich mich persönlich durch die Idee weiterentwickeln?</a:t>
-            </a:r>
-          </a:p>
-          <a:p>
-            <a:pPr lvl="1"/>
-            <a:r>
-              <a:rPr lang="de-DE" sz="900" dirty="0"/>
-              <a:t>Wie sehr kann ich mich durch die Idee selbst ausdrücken?</a:t>
-            </a:r>
-          </a:p>
-          <a:p>
-            <a:pPr lvl="1"/>
-            <a:r>
-              <a:rPr lang="de-DE" sz="900" dirty="0"/>
-              <a:t>Wird durch die Idee etwas grundsätzlich leichter oder weniger riskant?</a:t>
-            </a:r>
-          </a:p>
-          <a:p>
-            <a:r>
-              <a:rPr lang="de-DE" sz="900" dirty="0"/>
-              <a:t>Ein </a:t>
+              <a:t> hat immer eine Rangfolge, die aber nicht in Stein gemeißelt ist. In regelmäßigen Abständen wird das </a:t>
             </a:r>
             <a:r>
               <a:rPr lang="de-DE" sz="900" dirty="0" err="1"/>
@@ -1736,47 +1745,7 @@
             </a:r>
             <a:r>
               <a:rPr lang="de-DE" sz="900" dirty="0"/>
-              <a:t> hat immer eine Rangfolge, die aber nicht in Stein </a:t>
-            </a:r>
-            <a:r>
-              <a:rPr lang="de-DE" sz="900" dirty="0" smtClean="0"/>
-              <a:t>gemeißelt </a:t>
-            </a:r>
-            <a:r>
-              <a:rPr lang="de-DE" sz="900" dirty="0"/>
-              <a:t>ist. In regelmäßigen Abständen wird das </a:t>
-            </a:r>
-            <a:r>
-              <a:rPr lang="de-DE" sz="900" dirty="0" err="1"/>
-              <a:t>Backlog</a:t>
-            </a:r>
-            <a:r>
-              <a:rPr lang="de-DE" sz="900" dirty="0"/>
-              <a:t> gepflegt. Dabei </a:t>
-            </a:r>
-            <a:r>
-              <a:rPr lang="de-DE" sz="900" dirty="0" smtClean="0"/>
-              <a:t>schaust Du </a:t>
-            </a:r>
-            <a:r>
-              <a:rPr lang="de-DE" sz="900" dirty="0"/>
-              <a:t>es </a:t>
-            </a:r>
-            <a:r>
-              <a:rPr lang="de-DE" sz="900" dirty="0" smtClean="0"/>
-              <a:t>Dir durch </a:t>
-            </a:r>
-            <a:r>
-              <a:rPr lang="de-DE" sz="900" dirty="0"/>
-              <a:t>und </a:t>
-            </a:r>
-            <a:r>
-              <a:rPr lang="de-DE" sz="900" dirty="0" smtClean="0"/>
-              <a:t>vergibst </a:t>
-            </a:r>
-            <a:r>
-              <a:rPr lang="de-DE" sz="900" dirty="0"/>
-              <a:t>evtl. neue Prioritäten.</a:t>
+              <a:t> gepflegt. Dabei schaust Du es Dir durch und vergibst evtl. neue Prioritäten.</a:t>
             </a:r>
             <a:r>
               <a:rPr lang="de-DE" dirty="0"/>
@@ -1804,10 +1773,9 @@
               <a:buNone/>
             </a:pPr>
             <a:r>
-              <a:rPr lang="de-DE" dirty="0" smtClean="0"/>
+              <a:rPr lang="de-DE" dirty="0"/>
               <a:t>Regina Brandhuber</a:t>
             </a:r>
-            <a:endParaRPr lang="de-DE" dirty="0"/>
           </a:p>
         </p:txBody>
       </p:sp>
@@ -1886,7 +1854,13 @@
           <a:p>
             <a:r>
               <a:rPr lang="de-DE" dirty="0"/>
-              <a:t>Nachdem Du Dein </a:t>
+              <a:t>Nachdem Du Dein Backlog erstellt hast, pflege es in 2 Wochen noch weitere 2 Mal, indem Du neue Ideen aufnimmst und ihnen eine Rangfolge gibst, alte Ideen, die evtl. bereits umgesetzt sind oder ihre Relevanz verloren haben, herausnimmst und, falls gewünscht, bestehende Ideen neu priorisierst oder weiterentwickelst (siehe IDE 14).</a:t>
+            </a:r>
+          </a:p>
+          <a:p>
+            <a:r>
+              <a:rPr lang="de-DE" dirty="0"/>
+              <a:t>Für die Zertifizierung lass Dir von Deinem Team Dein </a:t>
             </a:r>
             <a:r>
               <a:rPr lang="de-DE" dirty="0" err="1"/>
@@ -1894,28 +1868,6 @@
             </a:r>
             <a:r>
               <a:rPr lang="de-DE" dirty="0"/>
-              <a:t> erstellt hast, pflege Dein </a:t>
-            </a:r>
-            <a:r>
-              <a:rPr lang="de-DE" dirty="0" err="1"/>
-              <a:t>Backlog</a:t>
-            </a:r>
-            <a:r>
-              <a:rPr lang="de-DE" dirty="0"/>
-              <a:t> in 2 Wochen noch weitere 2 Mal, indem Du neue Ideen aufnimmst und ihnen eine Rangfolge gibst, alte Ideen, die evtl. bereits umgesetzt sind oder ihre Relevanz verloren haben, herausnimmst und, falls gewünscht, bestehende Ideen neu priorisierst.</a:t>
-            </a:r>
-          </a:p>
-          <a:p>
-            <a:r>
-              <a:rPr lang="de-DE" dirty="0"/>
-              <a:t>Für die Zertifizierung lass Dir von Deinem Team Dein </a:t>
-            </a:r>
-            <a:r>
-              <a:rPr lang="de-DE" dirty="0" err="1"/>
-              <a:t>Backlog</a:t>
-            </a:r>
-            <a:r>
-              <a:rPr lang="de-DE" dirty="0"/>
               <a:t> und 2 Überarbeitungen Deines </a:t>
             </a:r>
             <a:r>
@@ -1926,7 +1878,6 @@
               <a:rPr lang="de-DE" dirty="0"/>
               <a:t> unterzeichnen.</a:t>
             </a:r>
-            <a:endParaRPr lang="de-DE" dirty="0"/>
           </a:p>
         </p:txBody>
       </p:sp>

</xml_diff>